<commit_message>
finish draft of paxos lease
</commit_message>
<xml_diff>
--- a/paxoslease/paxoslease.pptx
+++ b/paxoslease/paxoslease.pptx
@@ -290,7 +290,7 @@
           <a:p>
             <a:fld id="{6B05F586-431A-4F7F-8C2D-DFC73BB28F6E}" type="datetimeFigureOut">
               <a:rPr lang="zh-CN" altLang="en-US" smtClean="0"/>
-              <a:t>2012/12/24</a:t>
+              <a:t>2012/12/26</a:t>
             </a:fld>
             <a:endParaRPr lang="zh-CN" altLang="en-US"/>
           </a:p>
@@ -460,7 +460,7 @@
           <a:p>
             <a:fld id="{6B05F586-431A-4F7F-8C2D-DFC73BB28F6E}" type="datetimeFigureOut">
               <a:rPr lang="zh-CN" altLang="en-US" smtClean="0"/>
-              <a:t>2012/12/24</a:t>
+              <a:t>2012/12/26</a:t>
             </a:fld>
             <a:endParaRPr lang="zh-CN" altLang="en-US"/>
           </a:p>
@@ -640,7 +640,7 @@
           <a:p>
             <a:fld id="{6B05F586-431A-4F7F-8C2D-DFC73BB28F6E}" type="datetimeFigureOut">
               <a:rPr lang="zh-CN" altLang="en-US" smtClean="0"/>
-              <a:t>2012/12/24</a:t>
+              <a:t>2012/12/26</a:t>
             </a:fld>
             <a:endParaRPr lang="zh-CN" altLang="en-US"/>
           </a:p>
@@ -810,7 +810,7 @@
           <a:p>
             <a:fld id="{6B05F586-431A-4F7F-8C2D-DFC73BB28F6E}" type="datetimeFigureOut">
               <a:rPr lang="zh-CN" altLang="en-US" smtClean="0"/>
-              <a:t>2012/12/24</a:t>
+              <a:t>2012/12/26</a:t>
             </a:fld>
             <a:endParaRPr lang="zh-CN" altLang="en-US"/>
           </a:p>
@@ -1056,7 +1056,7 @@
           <a:p>
             <a:fld id="{6B05F586-431A-4F7F-8C2D-DFC73BB28F6E}" type="datetimeFigureOut">
               <a:rPr lang="zh-CN" altLang="en-US" smtClean="0"/>
-              <a:t>2012/12/24</a:t>
+              <a:t>2012/12/26</a:t>
             </a:fld>
             <a:endParaRPr lang="zh-CN" altLang="en-US"/>
           </a:p>
@@ -1344,7 +1344,7 @@
           <a:p>
             <a:fld id="{6B05F586-431A-4F7F-8C2D-DFC73BB28F6E}" type="datetimeFigureOut">
               <a:rPr lang="zh-CN" altLang="en-US" smtClean="0"/>
-              <a:t>2012/12/24</a:t>
+              <a:t>2012/12/26</a:t>
             </a:fld>
             <a:endParaRPr lang="zh-CN" altLang="en-US"/>
           </a:p>
@@ -1766,7 +1766,7 @@
           <a:p>
             <a:fld id="{6B05F586-431A-4F7F-8C2D-DFC73BB28F6E}" type="datetimeFigureOut">
               <a:rPr lang="zh-CN" altLang="en-US" smtClean="0"/>
-              <a:t>2012/12/24</a:t>
+              <a:t>2012/12/26</a:t>
             </a:fld>
             <a:endParaRPr lang="zh-CN" altLang="en-US"/>
           </a:p>
@@ -1884,7 +1884,7 @@
           <a:p>
             <a:fld id="{6B05F586-431A-4F7F-8C2D-DFC73BB28F6E}" type="datetimeFigureOut">
               <a:rPr lang="zh-CN" altLang="en-US" smtClean="0"/>
-              <a:t>2012/12/24</a:t>
+              <a:t>2012/12/26</a:t>
             </a:fld>
             <a:endParaRPr lang="zh-CN" altLang="en-US"/>
           </a:p>
@@ -1979,7 +1979,7 @@
           <a:p>
             <a:fld id="{6B05F586-431A-4F7F-8C2D-DFC73BB28F6E}" type="datetimeFigureOut">
               <a:rPr lang="zh-CN" altLang="en-US" smtClean="0"/>
-              <a:t>2012/12/24</a:t>
+              <a:t>2012/12/26</a:t>
             </a:fld>
             <a:endParaRPr lang="zh-CN" altLang="en-US"/>
           </a:p>
@@ -2256,7 +2256,7 @@
           <a:p>
             <a:fld id="{6B05F586-431A-4F7F-8C2D-DFC73BB28F6E}" type="datetimeFigureOut">
               <a:rPr lang="zh-CN" altLang="en-US" smtClean="0"/>
-              <a:t>2012/12/24</a:t>
+              <a:t>2012/12/26</a:t>
             </a:fld>
             <a:endParaRPr lang="zh-CN" altLang="en-US"/>
           </a:p>
@@ -2509,7 +2509,7 @@
           <a:p>
             <a:fld id="{6B05F586-431A-4F7F-8C2D-DFC73BB28F6E}" type="datetimeFigureOut">
               <a:rPr lang="zh-CN" altLang="en-US" smtClean="0"/>
-              <a:t>2012/12/24</a:t>
+              <a:t>2012/12/26</a:t>
             </a:fld>
             <a:endParaRPr lang="zh-CN" altLang="en-US"/>
           </a:p>
@@ -2722,7 +2722,7 @@
           <a:p>
             <a:fld id="{6B05F586-431A-4F7F-8C2D-DFC73BB28F6E}" type="datetimeFigureOut">
               <a:rPr lang="zh-CN" altLang="en-US" smtClean="0"/>
-              <a:t>2012/12/24</a:t>
+              <a:t>2012/12/26</a:t>
             </a:fld>
             <a:endParaRPr lang="zh-CN" altLang="en-US"/>
           </a:p>
@@ -3534,41 +3534,1807 @@
           <a:chExt cx="0" cy="0"/>
         </a:xfrm>
       </p:grpSpPr>
-      <p:sp>
-        <p:nvSpPr>
-          <p:cNvPr id="2" name="标题 1"/>
-          <p:cNvSpPr>
-            <a:spLocks noGrp="1"/>
-          </p:cNvSpPr>
-          <p:nvPr>
-            <p:ph type="title"/>
-          </p:nvPr>
-        </p:nvSpPr>
-        <p:spPr/>
-        <p:txBody>
-          <a:bodyPr/>
-          <a:lstStyle/>
-          <a:p>
-            <a:endParaRPr lang="zh-CN" altLang="en-US"/>
-          </a:p>
-        </p:txBody>
-      </p:sp>
-      <p:sp>
-        <p:nvSpPr>
-          <p:cNvPr id="3" name="内容占位符 2"/>
-          <p:cNvSpPr>
-            <a:spLocks noGrp="1"/>
-          </p:cNvSpPr>
-          <p:nvPr>
-            <p:ph idx="1"/>
-          </p:nvPr>
-        </p:nvSpPr>
-        <p:spPr/>
-        <p:txBody>
-          <a:bodyPr/>
-          <a:lstStyle/>
-          <a:p>
-            <a:endParaRPr lang="zh-CN" altLang="en-US"/>
+      <p:cxnSp>
+        <p:nvCxnSpPr>
+          <p:cNvPr id="5" name="直接箭头连接符 4"/>
+          <p:cNvCxnSpPr/>
+          <p:nvPr/>
+        </p:nvCxnSpPr>
+        <p:spPr>
+          <a:xfrm>
+            <a:off x="827584" y="1412776"/>
+            <a:ext cx="9001000" cy="22684"/>
+          </a:xfrm>
+          <a:prstGeom prst="straightConnector1">
+            <a:avLst/>
+          </a:prstGeom>
+          <a:ln>
+            <a:tailEnd type="arrow"/>
+          </a:ln>
+        </p:spPr>
+        <p:style>
+          <a:lnRef idx="3">
+            <a:schemeClr val="dk1"/>
+          </a:lnRef>
+          <a:fillRef idx="0">
+            <a:schemeClr val="dk1"/>
+          </a:fillRef>
+          <a:effectRef idx="2">
+            <a:schemeClr val="dk1"/>
+          </a:effectRef>
+          <a:fontRef idx="minor">
+            <a:schemeClr val="tx1"/>
+          </a:fontRef>
+        </p:style>
+      </p:cxnSp>
+      <p:cxnSp>
+        <p:nvCxnSpPr>
+          <p:cNvPr id="6" name="直接箭头连接符 5"/>
+          <p:cNvCxnSpPr/>
+          <p:nvPr/>
+        </p:nvCxnSpPr>
+        <p:spPr>
+          <a:xfrm flipV="1">
+            <a:off x="827584" y="2780927"/>
+            <a:ext cx="9649072" cy="2"/>
+          </a:xfrm>
+          <a:prstGeom prst="straightConnector1">
+            <a:avLst/>
+          </a:prstGeom>
+          <a:ln>
+            <a:tailEnd type="arrow"/>
+          </a:ln>
+        </p:spPr>
+        <p:style>
+          <a:lnRef idx="3">
+            <a:schemeClr val="dk1"/>
+          </a:lnRef>
+          <a:fillRef idx="0">
+            <a:schemeClr val="dk1"/>
+          </a:fillRef>
+          <a:effectRef idx="2">
+            <a:schemeClr val="dk1"/>
+          </a:effectRef>
+          <a:fontRef idx="minor">
+            <a:schemeClr val="tx1"/>
+          </a:fontRef>
+        </p:style>
+      </p:cxnSp>
+      <p:cxnSp>
+        <p:nvCxnSpPr>
+          <p:cNvPr id="7" name="直接箭头连接符 6"/>
+          <p:cNvCxnSpPr/>
+          <p:nvPr/>
+        </p:nvCxnSpPr>
+        <p:spPr>
+          <a:xfrm>
+            <a:off x="827584" y="3356992"/>
+            <a:ext cx="9649072" cy="22684"/>
+          </a:xfrm>
+          <a:prstGeom prst="straightConnector1">
+            <a:avLst/>
+          </a:prstGeom>
+          <a:ln>
+            <a:tailEnd type="arrow"/>
+          </a:ln>
+        </p:spPr>
+        <p:style>
+          <a:lnRef idx="3">
+            <a:schemeClr val="dk1"/>
+          </a:lnRef>
+          <a:fillRef idx="0">
+            <a:schemeClr val="dk1"/>
+          </a:fillRef>
+          <a:effectRef idx="2">
+            <a:schemeClr val="dk1"/>
+          </a:effectRef>
+          <a:fontRef idx="minor">
+            <a:schemeClr val="tx1"/>
+          </a:fontRef>
+        </p:style>
+      </p:cxnSp>
+      <p:cxnSp>
+        <p:nvCxnSpPr>
+          <p:cNvPr id="8" name="直接箭头连接符 7"/>
+          <p:cNvCxnSpPr/>
+          <p:nvPr/>
+        </p:nvCxnSpPr>
+        <p:spPr>
+          <a:xfrm>
+            <a:off x="827584" y="3933056"/>
+            <a:ext cx="9649072" cy="56808"/>
+          </a:xfrm>
+          <a:prstGeom prst="straightConnector1">
+            <a:avLst/>
+          </a:prstGeom>
+          <a:ln>
+            <a:tailEnd type="arrow"/>
+          </a:ln>
+        </p:spPr>
+        <p:style>
+          <a:lnRef idx="3">
+            <a:schemeClr val="dk1"/>
+          </a:lnRef>
+          <a:fillRef idx="0">
+            <a:schemeClr val="dk1"/>
+          </a:fillRef>
+          <a:effectRef idx="2">
+            <a:schemeClr val="dk1"/>
+          </a:effectRef>
+          <a:fontRef idx="minor">
+            <a:schemeClr val="tx1"/>
+          </a:fontRef>
+        </p:style>
+      </p:cxnSp>
+      <p:sp>
+        <p:nvSpPr>
+          <p:cNvPr id="9" name="TextBox 8"/>
+          <p:cNvSpPr txBox="1"/>
+          <p:nvPr/>
+        </p:nvSpPr>
+        <p:spPr>
+          <a:xfrm>
+            <a:off x="0" y="1228110"/>
+            <a:ext cx="1224136" cy="369332"/>
+          </a:xfrm>
+          <a:prstGeom prst="rect">
+            <a:avLst/>
+          </a:prstGeom>
+          <a:noFill/>
+        </p:spPr>
+        <p:txBody>
+          <a:bodyPr wrap="square" rtlCol="0">
+            <a:spAutoFit/>
+          </a:bodyPr>
+          <a:lstStyle/>
+          <a:p>
+            <a:r>
+              <a:rPr lang="zh-CN" altLang="en-US" b="1" dirty="0"/>
+              <a:t>请求者</a:t>
+            </a:r>
+          </a:p>
+        </p:txBody>
+      </p:sp>
+      <p:sp>
+        <p:nvSpPr>
+          <p:cNvPr id="10" name="TextBox 9"/>
+          <p:cNvSpPr txBox="1"/>
+          <p:nvPr/>
+        </p:nvSpPr>
+        <p:spPr>
+          <a:xfrm>
+            <a:off x="0" y="2596262"/>
+            <a:ext cx="1224136" cy="369332"/>
+          </a:xfrm>
+          <a:prstGeom prst="rect">
+            <a:avLst/>
+          </a:prstGeom>
+          <a:noFill/>
+        </p:spPr>
+        <p:txBody>
+          <a:bodyPr wrap="square" rtlCol="0">
+            <a:spAutoFit/>
+          </a:bodyPr>
+          <a:lstStyle/>
+          <a:p>
+            <a:r>
+              <a:rPr lang="zh-CN" altLang="en-US" b="1" dirty="0"/>
+              <a:t>授受</a:t>
+            </a:r>
+            <a:r>
+              <a:rPr lang="zh-CN" altLang="en-US" b="1" dirty="0" smtClean="0"/>
+              <a:t>者</a:t>
+            </a:r>
+            <a:endParaRPr lang="zh-CN" altLang="en-US" b="1" dirty="0"/>
+          </a:p>
+        </p:txBody>
+      </p:sp>
+      <p:sp>
+        <p:nvSpPr>
+          <p:cNvPr id="11" name="TextBox 10"/>
+          <p:cNvSpPr txBox="1"/>
+          <p:nvPr/>
+        </p:nvSpPr>
+        <p:spPr>
+          <a:xfrm>
+            <a:off x="0" y="3172326"/>
+            <a:ext cx="1224136" cy="369332"/>
+          </a:xfrm>
+          <a:prstGeom prst="rect">
+            <a:avLst/>
+          </a:prstGeom>
+          <a:noFill/>
+        </p:spPr>
+        <p:txBody>
+          <a:bodyPr wrap="square" rtlCol="0">
+            <a:spAutoFit/>
+          </a:bodyPr>
+          <a:lstStyle/>
+          <a:p>
+            <a:r>
+              <a:rPr lang="zh-CN" altLang="en-US" b="1" dirty="0"/>
+              <a:t>授受</a:t>
+            </a:r>
+            <a:r>
+              <a:rPr lang="zh-CN" altLang="en-US" b="1" dirty="0" smtClean="0"/>
+              <a:t>者</a:t>
+            </a:r>
+            <a:endParaRPr lang="zh-CN" altLang="en-US" b="1" dirty="0"/>
+          </a:p>
+        </p:txBody>
+      </p:sp>
+      <p:sp>
+        <p:nvSpPr>
+          <p:cNvPr id="12" name="TextBox 11"/>
+          <p:cNvSpPr txBox="1"/>
+          <p:nvPr/>
+        </p:nvSpPr>
+        <p:spPr>
+          <a:xfrm>
+            <a:off x="0" y="3748390"/>
+            <a:ext cx="1224136" cy="369332"/>
+          </a:xfrm>
+          <a:prstGeom prst="rect">
+            <a:avLst/>
+          </a:prstGeom>
+          <a:noFill/>
+        </p:spPr>
+        <p:txBody>
+          <a:bodyPr wrap="square" rtlCol="0">
+            <a:spAutoFit/>
+          </a:bodyPr>
+          <a:lstStyle/>
+          <a:p>
+            <a:r>
+              <a:rPr lang="zh-CN" altLang="en-US" b="1" dirty="0"/>
+              <a:t>授受</a:t>
+            </a:r>
+            <a:r>
+              <a:rPr lang="zh-CN" altLang="en-US" b="1" dirty="0" smtClean="0"/>
+              <a:t>者</a:t>
+            </a:r>
+            <a:endParaRPr lang="zh-CN" altLang="en-US" b="1" dirty="0"/>
+          </a:p>
+        </p:txBody>
+      </p:sp>
+      <p:cxnSp>
+        <p:nvCxnSpPr>
+          <p:cNvPr id="14" name="直接箭头连接符 13"/>
+          <p:cNvCxnSpPr/>
+          <p:nvPr/>
+        </p:nvCxnSpPr>
+        <p:spPr>
+          <a:xfrm>
+            <a:off x="1979712" y="1412776"/>
+            <a:ext cx="0" cy="1368152"/>
+          </a:xfrm>
+          <a:prstGeom prst="straightConnector1">
+            <a:avLst/>
+          </a:prstGeom>
+          <a:ln>
+            <a:tailEnd type="arrow"/>
+          </a:ln>
+          <a:effectLst>
+            <a:outerShdw blurRad="50800" dist="38100" dir="2700000" algn="tl" rotWithShape="0">
+              <a:prstClr val="black">
+                <a:alpha val="40000"/>
+              </a:prstClr>
+            </a:outerShdw>
+          </a:effectLst>
+        </p:spPr>
+        <p:style>
+          <a:lnRef idx="2">
+            <a:schemeClr val="accent1"/>
+          </a:lnRef>
+          <a:fillRef idx="0">
+            <a:schemeClr val="accent1"/>
+          </a:fillRef>
+          <a:effectRef idx="1">
+            <a:schemeClr val="accent1"/>
+          </a:effectRef>
+          <a:fontRef idx="minor">
+            <a:schemeClr val="tx1"/>
+          </a:fontRef>
+        </p:style>
+      </p:cxnSp>
+      <p:cxnSp>
+        <p:nvCxnSpPr>
+          <p:cNvPr id="15" name="直接箭头连接符 14"/>
+          <p:cNvCxnSpPr/>
+          <p:nvPr/>
+        </p:nvCxnSpPr>
+        <p:spPr>
+          <a:xfrm>
+            <a:off x="2195736" y="1412776"/>
+            <a:ext cx="0" cy="1944216"/>
+          </a:xfrm>
+          <a:prstGeom prst="straightConnector1">
+            <a:avLst/>
+          </a:prstGeom>
+          <a:ln>
+            <a:tailEnd type="arrow"/>
+          </a:ln>
+          <a:effectLst>
+            <a:outerShdw blurRad="50800" dist="38100" dir="2700000" algn="tl" rotWithShape="0">
+              <a:prstClr val="black">
+                <a:alpha val="40000"/>
+              </a:prstClr>
+            </a:outerShdw>
+          </a:effectLst>
+        </p:spPr>
+        <p:style>
+          <a:lnRef idx="2">
+            <a:schemeClr val="accent1"/>
+          </a:lnRef>
+          <a:fillRef idx="0">
+            <a:schemeClr val="accent1"/>
+          </a:fillRef>
+          <a:effectRef idx="1">
+            <a:schemeClr val="accent1"/>
+          </a:effectRef>
+          <a:fontRef idx="minor">
+            <a:schemeClr val="tx1"/>
+          </a:fontRef>
+        </p:style>
+      </p:cxnSp>
+      <p:cxnSp>
+        <p:nvCxnSpPr>
+          <p:cNvPr id="16" name="直接箭头连接符 15"/>
+          <p:cNvCxnSpPr/>
+          <p:nvPr/>
+        </p:nvCxnSpPr>
+        <p:spPr>
+          <a:xfrm>
+            <a:off x="2411760" y="1412776"/>
+            <a:ext cx="0" cy="2520280"/>
+          </a:xfrm>
+          <a:prstGeom prst="straightConnector1">
+            <a:avLst/>
+          </a:prstGeom>
+          <a:ln>
+            <a:tailEnd type="arrow"/>
+          </a:ln>
+          <a:effectLst>
+            <a:outerShdw blurRad="50800" dist="38100" dir="2700000" algn="tl" rotWithShape="0">
+              <a:prstClr val="black">
+                <a:alpha val="40000"/>
+              </a:prstClr>
+            </a:outerShdw>
+          </a:effectLst>
+        </p:spPr>
+        <p:style>
+          <a:lnRef idx="2">
+            <a:schemeClr val="accent1"/>
+          </a:lnRef>
+          <a:fillRef idx="0">
+            <a:schemeClr val="accent1"/>
+          </a:fillRef>
+          <a:effectRef idx="1">
+            <a:schemeClr val="accent1"/>
+          </a:effectRef>
+          <a:fontRef idx="minor">
+            <a:schemeClr val="tx1"/>
+          </a:fontRef>
+        </p:style>
+      </p:cxnSp>
+      <p:sp>
+        <p:nvSpPr>
+          <p:cNvPr id="19" name="TextBox 18"/>
+          <p:cNvSpPr txBox="1"/>
+          <p:nvPr/>
+        </p:nvSpPr>
+        <p:spPr>
+          <a:xfrm>
+            <a:off x="777712" y="581779"/>
+            <a:ext cx="1418024" cy="584775"/>
+          </a:xfrm>
+          <a:prstGeom prst="rect">
+            <a:avLst/>
+          </a:prstGeom>
+          <a:noFill/>
+        </p:spPr>
+        <p:txBody>
+          <a:bodyPr wrap="square" rtlCol="0">
+            <a:spAutoFit/>
+          </a:bodyPr>
+          <a:lstStyle/>
+          <a:p>
+            <a:r>
+              <a:rPr lang="zh-CN" altLang="en-US" sz="1600" dirty="0" smtClean="0"/>
+              <a:t>启动定时器</a:t>
+            </a:r>
+            <a:endParaRPr lang="en-US" altLang="zh-CN" sz="1600" dirty="0" smtClean="0"/>
+          </a:p>
+          <a:p>
+            <a:r>
+              <a:rPr lang="en-US" altLang="zh-CN" sz="1600" dirty="0" smtClean="0"/>
+              <a:t>T</a:t>
+            </a:r>
+            <a:r>
+              <a:rPr lang="zh-CN" altLang="en-US" sz="1600" dirty="0" smtClean="0"/>
+              <a:t>秒超时</a:t>
+            </a:r>
+            <a:endParaRPr lang="zh-CN" altLang="en-US" sz="1600" dirty="0"/>
+          </a:p>
+        </p:txBody>
+      </p:sp>
+      <p:sp>
+        <p:nvSpPr>
+          <p:cNvPr id="20" name="TextBox 19"/>
+          <p:cNvSpPr txBox="1"/>
+          <p:nvPr/>
+        </p:nvSpPr>
+        <p:spPr>
+          <a:xfrm>
+            <a:off x="1979712" y="553879"/>
+            <a:ext cx="746152" cy="584775"/>
+          </a:xfrm>
+          <a:prstGeom prst="rect">
+            <a:avLst/>
+          </a:prstGeom>
+          <a:noFill/>
+        </p:spPr>
+        <p:txBody>
+          <a:bodyPr wrap="square" rtlCol="0">
+            <a:spAutoFit/>
+          </a:bodyPr>
+          <a:lstStyle/>
+          <a:p>
+            <a:r>
+              <a:rPr lang="zh-CN" altLang="en-US" sz="1600" dirty="0" smtClean="0"/>
+              <a:t>准备</a:t>
+            </a:r>
+            <a:endParaRPr lang="en-US" altLang="zh-CN" sz="1600" dirty="0" smtClean="0"/>
+          </a:p>
+          <a:p>
+            <a:r>
+              <a:rPr lang="zh-CN" altLang="en-US" sz="1600" dirty="0"/>
+              <a:t>请求</a:t>
+            </a:r>
+          </a:p>
+        </p:txBody>
+      </p:sp>
+      <p:cxnSp>
+        <p:nvCxnSpPr>
+          <p:cNvPr id="22" name="直接箭头连接符 21"/>
+          <p:cNvCxnSpPr/>
+          <p:nvPr/>
+        </p:nvCxnSpPr>
+        <p:spPr>
+          <a:xfrm flipV="1">
+            <a:off x="3088980" y="1412776"/>
+            <a:ext cx="0" cy="1368152"/>
+          </a:xfrm>
+          <a:prstGeom prst="straightConnector1">
+            <a:avLst/>
+          </a:prstGeom>
+          <a:ln>
+            <a:tailEnd type="arrow"/>
+          </a:ln>
+        </p:spPr>
+        <p:style>
+          <a:lnRef idx="2">
+            <a:schemeClr val="accent6"/>
+          </a:lnRef>
+          <a:fillRef idx="0">
+            <a:schemeClr val="accent6"/>
+          </a:fillRef>
+          <a:effectRef idx="1">
+            <a:schemeClr val="accent6"/>
+          </a:effectRef>
+          <a:fontRef idx="minor">
+            <a:schemeClr val="tx1"/>
+          </a:fontRef>
+        </p:style>
+      </p:cxnSp>
+      <p:cxnSp>
+        <p:nvCxnSpPr>
+          <p:cNvPr id="23" name="直接箭头连接符 22"/>
+          <p:cNvCxnSpPr/>
+          <p:nvPr/>
+        </p:nvCxnSpPr>
+        <p:spPr>
+          <a:xfrm flipV="1">
+            <a:off x="3275856" y="1412776"/>
+            <a:ext cx="0" cy="1944216"/>
+          </a:xfrm>
+          <a:prstGeom prst="straightConnector1">
+            <a:avLst/>
+          </a:prstGeom>
+          <a:ln>
+            <a:tailEnd type="arrow"/>
+          </a:ln>
+        </p:spPr>
+        <p:style>
+          <a:lnRef idx="2">
+            <a:schemeClr val="accent6"/>
+          </a:lnRef>
+          <a:fillRef idx="0">
+            <a:schemeClr val="accent6"/>
+          </a:fillRef>
+          <a:effectRef idx="1">
+            <a:schemeClr val="accent6"/>
+          </a:effectRef>
+          <a:fontRef idx="minor">
+            <a:schemeClr val="tx1"/>
+          </a:fontRef>
+        </p:style>
+      </p:cxnSp>
+      <p:cxnSp>
+        <p:nvCxnSpPr>
+          <p:cNvPr id="24" name="直接箭头连接符 23"/>
+          <p:cNvCxnSpPr/>
+          <p:nvPr/>
+        </p:nvCxnSpPr>
+        <p:spPr>
+          <a:xfrm flipV="1">
+            <a:off x="3491880" y="1412776"/>
+            <a:ext cx="0" cy="2520280"/>
+          </a:xfrm>
+          <a:prstGeom prst="straightConnector1">
+            <a:avLst/>
+          </a:prstGeom>
+          <a:ln>
+            <a:tailEnd type="arrow"/>
+          </a:ln>
+        </p:spPr>
+        <p:style>
+          <a:lnRef idx="2">
+            <a:schemeClr val="accent6"/>
+          </a:lnRef>
+          <a:fillRef idx="0">
+            <a:schemeClr val="accent6"/>
+          </a:fillRef>
+          <a:effectRef idx="1">
+            <a:schemeClr val="accent6"/>
+          </a:effectRef>
+          <a:fontRef idx="minor">
+            <a:schemeClr val="tx1"/>
+          </a:fontRef>
+        </p:style>
+      </p:cxnSp>
+      <p:sp>
+        <p:nvSpPr>
+          <p:cNvPr id="25" name="TextBox 24"/>
+          <p:cNvSpPr txBox="1"/>
+          <p:nvPr/>
+        </p:nvSpPr>
+        <p:spPr>
+          <a:xfrm>
+            <a:off x="3016972" y="581779"/>
+            <a:ext cx="746152" cy="584775"/>
+          </a:xfrm>
+          <a:prstGeom prst="rect">
+            <a:avLst/>
+          </a:prstGeom>
+          <a:noFill/>
+        </p:spPr>
+        <p:txBody>
+          <a:bodyPr wrap="square" rtlCol="0">
+            <a:spAutoFit/>
+          </a:bodyPr>
+          <a:lstStyle/>
+          <a:p>
+            <a:r>
+              <a:rPr lang="zh-CN" altLang="en-US" sz="1600" dirty="0" smtClean="0"/>
+              <a:t>准备</a:t>
+            </a:r>
+            <a:endParaRPr lang="en-US" altLang="zh-CN" sz="1600" dirty="0" smtClean="0"/>
+          </a:p>
+          <a:p>
+            <a:r>
+              <a:rPr lang="zh-CN" altLang="en-US" sz="1600" dirty="0"/>
+              <a:t>响应</a:t>
+            </a:r>
+          </a:p>
+        </p:txBody>
+      </p:sp>
+      <p:sp>
+        <p:nvSpPr>
+          <p:cNvPr id="26" name="五角星 25"/>
+          <p:cNvSpPr/>
+          <p:nvPr/>
+        </p:nvSpPr>
+        <p:spPr>
+          <a:xfrm>
+            <a:off x="3779912" y="1228110"/>
+            <a:ext cx="360040" cy="369332"/>
+          </a:xfrm>
+          <a:prstGeom prst="star5">
+            <a:avLst/>
+          </a:prstGeom>
+          <a:solidFill>
+            <a:schemeClr val="bg1"/>
+          </a:solidFill>
+          <a:ln w="19050"/>
+          <a:effectLst>
+            <a:outerShdw blurRad="50800" dist="38100" dir="2700000" algn="tl" rotWithShape="0">
+              <a:prstClr val="black">
+                <a:alpha val="40000"/>
+              </a:prstClr>
+            </a:outerShdw>
+          </a:effectLst>
+        </p:spPr>
+        <p:style>
+          <a:lnRef idx="1">
+            <a:schemeClr val="dk1"/>
+          </a:lnRef>
+          <a:fillRef idx="2">
+            <a:schemeClr val="dk1"/>
+          </a:fillRef>
+          <a:effectRef idx="1">
+            <a:schemeClr val="dk1"/>
+          </a:effectRef>
+          <a:fontRef idx="minor">
+            <a:schemeClr val="dk1"/>
+          </a:fontRef>
+        </p:style>
+        <p:txBody>
+          <a:bodyPr rtlCol="0" anchor="ctr"/>
+          <a:lstStyle/>
+          <a:p>
+            <a:pPr algn="ctr"/>
+            <a:endParaRPr lang="zh-CN" altLang="en-US" sz="1400"/>
+          </a:p>
+        </p:txBody>
+      </p:sp>
+      <p:cxnSp>
+        <p:nvCxnSpPr>
+          <p:cNvPr id="27" name="直接箭头连接符 26"/>
+          <p:cNvCxnSpPr/>
+          <p:nvPr/>
+        </p:nvCxnSpPr>
+        <p:spPr>
+          <a:xfrm>
+            <a:off x="4644008" y="1435460"/>
+            <a:ext cx="0" cy="1368152"/>
+          </a:xfrm>
+          <a:prstGeom prst="straightConnector1">
+            <a:avLst/>
+          </a:prstGeom>
+          <a:ln>
+            <a:tailEnd type="arrow"/>
+          </a:ln>
+          <a:effectLst>
+            <a:outerShdw blurRad="50800" dist="38100" dir="2700000" algn="tl" rotWithShape="0">
+              <a:prstClr val="black">
+                <a:alpha val="40000"/>
+              </a:prstClr>
+            </a:outerShdw>
+          </a:effectLst>
+        </p:spPr>
+        <p:style>
+          <a:lnRef idx="2">
+            <a:schemeClr val="accent1"/>
+          </a:lnRef>
+          <a:fillRef idx="0">
+            <a:schemeClr val="accent1"/>
+          </a:fillRef>
+          <a:effectRef idx="1">
+            <a:schemeClr val="accent1"/>
+          </a:effectRef>
+          <a:fontRef idx="minor">
+            <a:schemeClr val="tx1"/>
+          </a:fontRef>
+        </p:style>
+      </p:cxnSp>
+      <p:cxnSp>
+        <p:nvCxnSpPr>
+          <p:cNvPr id="28" name="直接箭头连接符 27"/>
+          <p:cNvCxnSpPr/>
+          <p:nvPr/>
+        </p:nvCxnSpPr>
+        <p:spPr>
+          <a:xfrm>
+            <a:off x="4860032" y="1435460"/>
+            <a:ext cx="0" cy="1944216"/>
+          </a:xfrm>
+          <a:prstGeom prst="straightConnector1">
+            <a:avLst/>
+          </a:prstGeom>
+          <a:ln>
+            <a:tailEnd type="arrow"/>
+          </a:ln>
+          <a:effectLst>
+            <a:outerShdw blurRad="50800" dist="38100" dir="2700000" algn="tl" rotWithShape="0">
+              <a:prstClr val="black">
+                <a:alpha val="40000"/>
+              </a:prstClr>
+            </a:outerShdw>
+          </a:effectLst>
+        </p:spPr>
+        <p:style>
+          <a:lnRef idx="2">
+            <a:schemeClr val="accent1"/>
+          </a:lnRef>
+          <a:fillRef idx="0">
+            <a:schemeClr val="accent1"/>
+          </a:fillRef>
+          <a:effectRef idx="1">
+            <a:schemeClr val="accent1"/>
+          </a:effectRef>
+          <a:fontRef idx="minor">
+            <a:schemeClr val="tx1"/>
+          </a:fontRef>
+        </p:style>
+      </p:cxnSp>
+      <p:cxnSp>
+        <p:nvCxnSpPr>
+          <p:cNvPr id="29" name="直接箭头连接符 28"/>
+          <p:cNvCxnSpPr/>
+          <p:nvPr/>
+        </p:nvCxnSpPr>
+        <p:spPr>
+          <a:xfrm>
+            <a:off x="5076056" y="1435460"/>
+            <a:ext cx="0" cy="2520280"/>
+          </a:xfrm>
+          <a:prstGeom prst="straightConnector1">
+            <a:avLst/>
+          </a:prstGeom>
+          <a:ln>
+            <a:tailEnd type="arrow"/>
+          </a:ln>
+          <a:effectLst>
+            <a:outerShdw blurRad="50800" dist="38100" dir="2700000" algn="tl" rotWithShape="0">
+              <a:prstClr val="black">
+                <a:alpha val="40000"/>
+              </a:prstClr>
+            </a:outerShdw>
+          </a:effectLst>
+        </p:spPr>
+        <p:style>
+          <a:lnRef idx="2">
+            <a:schemeClr val="accent1"/>
+          </a:lnRef>
+          <a:fillRef idx="0">
+            <a:schemeClr val="accent1"/>
+          </a:fillRef>
+          <a:effectRef idx="1">
+            <a:schemeClr val="accent1"/>
+          </a:effectRef>
+          <a:fontRef idx="minor">
+            <a:schemeClr val="tx1"/>
+          </a:fontRef>
+        </p:style>
+      </p:cxnSp>
+      <p:cxnSp>
+        <p:nvCxnSpPr>
+          <p:cNvPr id="30" name="直接箭头连接符 29"/>
+          <p:cNvCxnSpPr/>
+          <p:nvPr/>
+        </p:nvCxnSpPr>
+        <p:spPr>
+          <a:xfrm flipV="1">
+            <a:off x="5868144" y="1412776"/>
+            <a:ext cx="0" cy="1368152"/>
+          </a:xfrm>
+          <a:prstGeom prst="straightConnector1">
+            <a:avLst/>
+          </a:prstGeom>
+          <a:ln>
+            <a:tailEnd type="arrow"/>
+          </a:ln>
+        </p:spPr>
+        <p:style>
+          <a:lnRef idx="2">
+            <a:schemeClr val="accent6"/>
+          </a:lnRef>
+          <a:fillRef idx="0">
+            <a:schemeClr val="accent6"/>
+          </a:fillRef>
+          <a:effectRef idx="1">
+            <a:schemeClr val="accent6"/>
+          </a:effectRef>
+          <a:fontRef idx="minor">
+            <a:schemeClr val="tx1"/>
+          </a:fontRef>
+        </p:style>
+      </p:cxnSp>
+      <p:cxnSp>
+        <p:nvCxnSpPr>
+          <p:cNvPr id="31" name="直接箭头连接符 30"/>
+          <p:cNvCxnSpPr/>
+          <p:nvPr/>
+        </p:nvCxnSpPr>
+        <p:spPr>
+          <a:xfrm flipV="1">
+            <a:off x="6084168" y="1412776"/>
+            <a:ext cx="0" cy="1944216"/>
+          </a:xfrm>
+          <a:prstGeom prst="straightConnector1">
+            <a:avLst/>
+          </a:prstGeom>
+          <a:ln>
+            <a:tailEnd type="arrow"/>
+          </a:ln>
+        </p:spPr>
+        <p:style>
+          <a:lnRef idx="2">
+            <a:schemeClr val="accent6"/>
+          </a:lnRef>
+          <a:fillRef idx="0">
+            <a:schemeClr val="accent6"/>
+          </a:fillRef>
+          <a:effectRef idx="1">
+            <a:schemeClr val="accent6"/>
+          </a:effectRef>
+          <a:fontRef idx="minor">
+            <a:schemeClr val="tx1"/>
+          </a:fontRef>
+        </p:style>
+      </p:cxnSp>
+      <p:cxnSp>
+        <p:nvCxnSpPr>
+          <p:cNvPr id="32" name="直接箭头连接符 31"/>
+          <p:cNvCxnSpPr/>
+          <p:nvPr/>
+        </p:nvCxnSpPr>
+        <p:spPr>
+          <a:xfrm flipV="1">
+            <a:off x="6300192" y="1412776"/>
+            <a:ext cx="0" cy="2520280"/>
+          </a:xfrm>
+          <a:prstGeom prst="straightConnector1">
+            <a:avLst/>
+          </a:prstGeom>
+          <a:ln>
+            <a:tailEnd type="arrow"/>
+          </a:ln>
+        </p:spPr>
+        <p:style>
+          <a:lnRef idx="2">
+            <a:schemeClr val="accent6"/>
+          </a:lnRef>
+          <a:fillRef idx="0">
+            <a:schemeClr val="accent6"/>
+          </a:fillRef>
+          <a:effectRef idx="1">
+            <a:schemeClr val="accent6"/>
+          </a:effectRef>
+          <a:fontRef idx="minor">
+            <a:schemeClr val="tx1"/>
+          </a:fontRef>
+        </p:style>
+      </p:cxnSp>
+      <p:sp>
+        <p:nvSpPr>
+          <p:cNvPr id="33" name="五角星 32"/>
+          <p:cNvSpPr/>
+          <p:nvPr/>
+        </p:nvSpPr>
+        <p:spPr>
+          <a:xfrm>
+            <a:off x="5220072" y="2596262"/>
+            <a:ext cx="360040" cy="369332"/>
+          </a:xfrm>
+          <a:prstGeom prst="star5">
+            <a:avLst/>
+          </a:prstGeom>
+          <a:solidFill>
+            <a:schemeClr val="bg1"/>
+          </a:solidFill>
+          <a:ln w="19050"/>
+          <a:effectLst>
+            <a:outerShdw blurRad="50800" dist="38100" dir="2700000" algn="tl" rotWithShape="0">
+              <a:prstClr val="black">
+                <a:alpha val="40000"/>
+              </a:prstClr>
+            </a:outerShdw>
+          </a:effectLst>
+        </p:spPr>
+        <p:style>
+          <a:lnRef idx="1">
+            <a:schemeClr val="dk1"/>
+          </a:lnRef>
+          <a:fillRef idx="2">
+            <a:schemeClr val="dk1"/>
+          </a:fillRef>
+          <a:effectRef idx="1">
+            <a:schemeClr val="dk1"/>
+          </a:effectRef>
+          <a:fontRef idx="minor">
+            <a:schemeClr val="dk1"/>
+          </a:fontRef>
+        </p:style>
+        <p:txBody>
+          <a:bodyPr rtlCol="0" anchor="ctr"/>
+          <a:lstStyle/>
+          <a:p>
+            <a:pPr algn="ctr"/>
+            <a:endParaRPr lang="zh-CN" altLang="en-US"/>
+          </a:p>
+        </p:txBody>
+      </p:sp>
+      <p:sp>
+        <p:nvSpPr>
+          <p:cNvPr id="35" name="五角星 34"/>
+          <p:cNvSpPr/>
+          <p:nvPr/>
+        </p:nvSpPr>
+        <p:spPr>
+          <a:xfrm>
+            <a:off x="5796136" y="3707740"/>
+            <a:ext cx="360040" cy="369332"/>
+          </a:xfrm>
+          <a:prstGeom prst="star5">
+            <a:avLst/>
+          </a:prstGeom>
+          <a:solidFill>
+            <a:schemeClr val="bg1"/>
+          </a:solidFill>
+          <a:ln w="19050"/>
+          <a:effectLst>
+            <a:outerShdw blurRad="50800" dist="38100" dir="2700000" algn="tl" rotWithShape="0">
+              <a:prstClr val="black">
+                <a:alpha val="40000"/>
+              </a:prstClr>
+            </a:outerShdw>
+          </a:effectLst>
+        </p:spPr>
+        <p:style>
+          <a:lnRef idx="1">
+            <a:schemeClr val="dk1"/>
+          </a:lnRef>
+          <a:fillRef idx="2">
+            <a:schemeClr val="dk1"/>
+          </a:fillRef>
+          <a:effectRef idx="1">
+            <a:schemeClr val="dk1"/>
+          </a:effectRef>
+          <a:fontRef idx="minor">
+            <a:schemeClr val="dk1"/>
+          </a:fontRef>
+        </p:style>
+        <p:txBody>
+          <a:bodyPr rtlCol="0" anchor="ctr"/>
+          <a:lstStyle/>
+          <a:p>
+            <a:pPr algn="ctr"/>
+            <a:endParaRPr lang="zh-CN" altLang="en-US"/>
+          </a:p>
+        </p:txBody>
+      </p:sp>
+      <p:sp>
+        <p:nvSpPr>
+          <p:cNvPr id="36" name="五角星 35"/>
+          <p:cNvSpPr/>
+          <p:nvPr/>
+        </p:nvSpPr>
+        <p:spPr>
+          <a:xfrm>
+            <a:off x="5508104" y="3140968"/>
+            <a:ext cx="360040" cy="369332"/>
+          </a:xfrm>
+          <a:prstGeom prst="star5">
+            <a:avLst/>
+          </a:prstGeom>
+          <a:solidFill>
+            <a:schemeClr val="bg1"/>
+          </a:solidFill>
+          <a:ln w="19050"/>
+          <a:effectLst>
+            <a:outerShdw blurRad="50800" dist="38100" dir="2700000" algn="tl" rotWithShape="0">
+              <a:prstClr val="black">
+                <a:alpha val="40000"/>
+              </a:prstClr>
+            </a:outerShdw>
+          </a:effectLst>
+        </p:spPr>
+        <p:style>
+          <a:lnRef idx="1">
+            <a:schemeClr val="dk1"/>
+          </a:lnRef>
+          <a:fillRef idx="2">
+            <a:schemeClr val="dk1"/>
+          </a:fillRef>
+          <a:effectRef idx="1">
+            <a:schemeClr val="dk1"/>
+          </a:effectRef>
+          <a:fontRef idx="minor">
+            <a:schemeClr val="dk1"/>
+          </a:fontRef>
+        </p:style>
+        <p:txBody>
+          <a:bodyPr rtlCol="0" anchor="ctr"/>
+          <a:lstStyle/>
+          <a:p>
+            <a:pPr algn="ctr"/>
+            <a:endParaRPr lang="zh-CN" altLang="en-US"/>
+          </a:p>
+        </p:txBody>
+      </p:sp>
+      <p:sp>
+        <p:nvSpPr>
+          <p:cNvPr id="37" name="TextBox 36"/>
+          <p:cNvSpPr txBox="1"/>
+          <p:nvPr/>
+        </p:nvSpPr>
+        <p:spPr>
+          <a:xfrm>
+            <a:off x="8253652" y="1124744"/>
+            <a:ext cx="504056" cy="584775"/>
+          </a:xfrm>
+          <a:prstGeom prst="rect">
+            <a:avLst/>
+          </a:prstGeom>
+          <a:noFill/>
+        </p:spPr>
+        <p:txBody>
+          <a:bodyPr wrap="square" rtlCol="0">
+            <a:spAutoFit/>
+          </a:bodyPr>
+          <a:lstStyle/>
+          <a:p>
+            <a:r>
+              <a:rPr lang="en-US" altLang="zh-CN" sz="3200" b="1" dirty="0" smtClean="0">
+                <a:solidFill>
+                  <a:srgbClr val="FF0000"/>
+                </a:solidFill>
+                <a:effectLst>
+                  <a:outerShdw blurRad="38100" dist="38100" dir="2700000" algn="tl">
+                    <a:srgbClr val="000000">
+                      <a:alpha val="43137"/>
+                    </a:srgbClr>
+                  </a:outerShdw>
+                </a:effectLst>
+              </a:rPr>
+              <a:t>X</a:t>
+            </a:r>
+            <a:endParaRPr lang="zh-CN" altLang="en-US" sz="3200" b="1" dirty="0">
+              <a:solidFill>
+                <a:srgbClr val="FF0000"/>
+              </a:solidFill>
+              <a:effectLst>
+                <a:outerShdw blurRad="38100" dist="38100" dir="2700000" algn="tl">
+                  <a:srgbClr val="000000">
+                    <a:alpha val="43137"/>
+                  </a:srgbClr>
+                </a:outerShdw>
+              </a:effectLst>
+            </a:endParaRPr>
+          </a:p>
+        </p:txBody>
+      </p:sp>
+      <p:sp>
+        <p:nvSpPr>
+          <p:cNvPr id="38" name="TextBox 37"/>
+          <p:cNvSpPr txBox="1"/>
+          <p:nvPr/>
+        </p:nvSpPr>
+        <p:spPr>
+          <a:xfrm>
+            <a:off x="4617936" y="553878"/>
+            <a:ext cx="746152" cy="584775"/>
+          </a:xfrm>
+          <a:prstGeom prst="rect">
+            <a:avLst/>
+          </a:prstGeom>
+          <a:noFill/>
+        </p:spPr>
+        <p:txBody>
+          <a:bodyPr wrap="square" rtlCol="0">
+            <a:spAutoFit/>
+          </a:bodyPr>
+          <a:lstStyle/>
+          <a:p>
+            <a:r>
+              <a:rPr lang="zh-CN" altLang="en-US" sz="1600" dirty="0"/>
+              <a:t>提议</a:t>
+            </a:r>
+            <a:endParaRPr lang="en-US" altLang="zh-CN" sz="1600" dirty="0" smtClean="0"/>
+          </a:p>
+          <a:p>
+            <a:r>
+              <a:rPr lang="zh-CN" altLang="en-US" sz="1600" dirty="0" smtClean="0"/>
+              <a:t>请求</a:t>
+            </a:r>
+            <a:endParaRPr lang="zh-CN" altLang="en-US" sz="1600" dirty="0"/>
+          </a:p>
+        </p:txBody>
+      </p:sp>
+      <p:sp>
+        <p:nvSpPr>
+          <p:cNvPr id="39" name="TextBox 38"/>
+          <p:cNvSpPr txBox="1"/>
+          <p:nvPr/>
+        </p:nvSpPr>
+        <p:spPr>
+          <a:xfrm>
+            <a:off x="5842072" y="581779"/>
+            <a:ext cx="746152" cy="584775"/>
+          </a:xfrm>
+          <a:prstGeom prst="rect">
+            <a:avLst/>
+          </a:prstGeom>
+          <a:noFill/>
+        </p:spPr>
+        <p:txBody>
+          <a:bodyPr wrap="square" rtlCol="0">
+            <a:spAutoFit/>
+          </a:bodyPr>
+          <a:lstStyle/>
+          <a:p>
+            <a:r>
+              <a:rPr lang="zh-CN" altLang="en-US" sz="1600" dirty="0"/>
+              <a:t>提议</a:t>
+            </a:r>
+            <a:endParaRPr lang="en-US" altLang="zh-CN" sz="1600" dirty="0" smtClean="0"/>
+          </a:p>
+          <a:p>
+            <a:r>
+              <a:rPr lang="zh-CN" altLang="en-US" sz="1600" dirty="0" smtClean="0"/>
+              <a:t>响应</a:t>
+            </a:r>
+            <a:endParaRPr lang="zh-CN" altLang="en-US" sz="1600" dirty="0"/>
+          </a:p>
+        </p:txBody>
+      </p:sp>
+      <p:sp>
+        <p:nvSpPr>
+          <p:cNvPr id="40" name="TextBox 39"/>
+          <p:cNvSpPr txBox="1"/>
+          <p:nvPr/>
+        </p:nvSpPr>
+        <p:spPr>
+          <a:xfrm>
+            <a:off x="3507160" y="1657469"/>
+            <a:ext cx="1492304" cy="584775"/>
+          </a:xfrm>
+          <a:prstGeom prst="rect">
+            <a:avLst/>
+          </a:prstGeom>
+          <a:noFill/>
+        </p:spPr>
+        <p:txBody>
+          <a:bodyPr wrap="square" rtlCol="0">
+            <a:spAutoFit/>
+          </a:bodyPr>
+          <a:lstStyle/>
+          <a:p>
+            <a:r>
+              <a:rPr lang="zh-CN" altLang="en-US" sz="1600" dirty="0" smtClean="0"/>
+              <a:t>启动定时器</a:t>
+            </a:r>
+            <a:endParaRPr lang="en-US" altLang="zh-CN" sz="1600" dirty="0" smtClean="0"/>
+          </a:p>
+          <a:p>
+            <a:r>
+              <a:rPr lang="en-US" altLang="zh-CN" sz="1600" dirty="0" smtClean="0"/>
+              <a:t>T</a:t>
+            </a:r>
+            <a:r>
+              <a:rPr lang="zh-CN" altLang="en-US" sz="1600" dirty="0" smtClean="0"/>
+              <a:t>秒超时</a:t>
+            </a:r>
+            <a:endParaRPr lang="zh-CN" altLang="en-US" sz="1600" dirty="0"/>
+          </a:p>
+        </p:txBody>
+      </p:sp>
+      <p:sp>
+        <p:nvSpPr>
+          <p:cNvPr id="45" name="TextBox 44"/>
+          <p:cNvSpPr txBox="1"/>
+          <p:nvPr/>
+        </p:nvSpPr>
+        <p:spPr>
+          <a:xfrm>
+            <a:off x="9189756" y="2488540"/>
+            <a:ext cx="504056" cy="584775"/>
+          </a:xfrm>
+          <a:prstGeom prst="rect">
+            <a:avLst/>
+          </a:prstGeom>
+          <a:noFill/>
+        </p:spPr>
+        <p:txBody>
+          <a:bodyPr wrap="square" rtlCol="0">
+            <a:spAutoFit/>
+          </a:bodyPr>
+          <a:lstStyle/>
+          <a:p>
+            <a:r>
+              <a:rPr lang="en-US" altLang="zh-CN" sz="3200" b="1" dirty="0" smtClean="0">
+                <a:solidFill>
+                  <a:srgbClr val="FF0000"/>
+                </a:solidFill>
+                <a:effectLst>
+                  <a:outerShdw blurRad="38100" dist="38100" dir="2700000" algn="tl">
+                    <a:srgbClr val="000000">
+                      <a:alpha val="43137"/>
+                    </a:srgbClr>
+                  </a:outerShdw>
+                </a:effectLst>
+              </a:rPr>
+              <a:t>X</a:t>
+            </a:r>
+            <a:endParaRPr lang="zh-CN" altLang="en-US" sz="3200" b="1" dirty="0">
+              <a:solidFill>
+                <a:srgbClr val="FF0000"/>
+              </a:solidFill>
+              <a:effectLst>
+                <a:outerShdw blurRad="38100" dist="38100" dir="2700000" algn="tl">
+                  <a:srgbClr val="000000">
+                    <a:alpha val="43137"/>
+                  </a:srgbClr>
+                </a:outerShdw>
+              </a:effectLst>
+            </a:endParaRPr>
+          </a:p>
+        </p:txBody>
+      </p:sp>
+      <p:sp>
+        <p:nvSpPr>
+          <p:cNvPr id="46" name="TextBox 45"/>
+          <p:cNvSpPr txBox="1"/>
+          <p:nvPr/>
+        </p:nvSpPr>
+        <p:spPr>
+          <a:xfrm>
+            <a:off x="9547980" y="3076110"/>
+            <a:ext cx="504056" cy="584775"/>
+          </a:xfrm>
+          <a:prstGeom prst="rect">
+            <a:avLst/>
+          </a:prstGeom>
+          <a:noFill/>
+        </p:spPr>
+        <p:txBody>
+          <a:bodyPr wrap="square" rtlCol="0">
+            <a:spAutoFit/>
+          </a:bodyPr>
+          <a:lstStyle/>
+          <a:p>
+            <a:r>
+              <a:rPr lang="en-US" altLang="zh-CN" sz="3200" b="1" dirty="0" smtClean="0">
+                <a:solidFill>
+                  <a:srgbClr val="FF0000"/>
+                </a:solidFill>
+                <a:effectLst>
+                  <a:outerShdw blurRad="38100" dist="38100" dir="2700000" algn="tl">
+                    <a:srgbClr val="000000">
+                      <a:alpha val="43137"/>
+                    </a:srgbClr>
+                  </a:outerShdw>
+                </a:effectLst>
+              </a:rPr>
+              <a:t>X</a:t>
+            </a:r>
+            <a:endParaRPr lang="zh-CN" altLang="en-US" sz="3200" b="1" dirty="0">
+              <a:solidFill>
+                <a:srgbClr val="FF0000"/>
+              </a:solidFill>
+              <a:effectLst>
+                <a:outerShdw blurRad="38100" dist="38100" dir="2700000" algn="tl">
+                  <a:srgbClr val="000000">
+                    <a:alpha val="43137"/>
+                  </a:srgbClr>
+                </a:outerShdw>
+              </a:effectLst>
+            </a:endParaRPr>
+          </a:p>
+        </p:txBody>
+      </p:sp>
+      <p:sp>
+        <p:nvSpPr>
+          <p:cNvPr id="47" name="TextBox 46"/>
+          <p:cNvSpPr txBox="1"/>
+          <p:nvPr/>
+        </p:nvSpPr>
+        <p:spPr>
+          <a:xfrm>
+            <a:off x="9900592" y="3673600"/>
+            <a:ext cx="504056" cy="584775"/>
+          </a:xfrm>
+          <a:prstGeom prst="rect">
+            <a:avLst/>
+          </a:prstGeom>
+          <a:noFill/>
+        </p:spPr>
+        <p:txBody>
+          <a:bodyPr wrap="square" rtlCol="0">
+            <a:spAutoFit/>
+          </a:bodyPr>
+          <a:lstStyle/>
+          <a:p>
+            <a:r>
+              <a:rPr lang="en-US" altLang="zh-CN" sz="3200" b="1" dirty="0" smtClean="0">
+                <a:solidFill>
+                  <a:srgbClr val="FF0000"/>
+                </a:solidFill>
+                <a:effectLst>
+                  <a:outerShdw blurRad="38100" dist="38100" dir="2700000" algn="tl">
+                    <a:srgbClr val="000000">
+                      <a:alpha val="43137"/>
+                    </a:srgbClr>
+                  </a:outerShdw>
+                </a:effectLst>
+              </a:rPr>
+              <a:t>X</a:t>
+            </a:r>
+            <a:endParaRPr lang="zh-CN" altLang="en-US" sz="3200" b="1" dirty="0">
+              <a:solidFill>
+                <a:srgbClr val="FF0000"/>
+              </a:solidFill>
+              <a:effectLst>
+                <a:outerShdw blurRad="38100" dist="38100" dir="2700000" algn="tl">
+                  <a:srgbClr val="000000">
+                    <a:alpha val="43137"/>
+                  </a:srgbClr>
+                </a:outerShdw>
+              </a:effectLst>
+            </a:endParaRPr>
+          </a:p>
+        </p:txBody>
+      </p:sp>
+      <p:sp>
+        <p:nvSpPr>
+          <p:cNvPr id="56" name="TextBox 55"/>
+          <p:cNvSpPr txBox="1"/>
+          <p:nvPr/>
+        </p:nvSpPr>
+        <p:spPr>
+          <a:xfrm>
+            <a:off x="7020272" y="1196752"/>
+            <a:ext cx="864096" cy="461665"/>
+          </a:xfrm>
+          <a:prstGeom prst="rect">
+            <a:avLst/>
+          </a:prstGeom>
+          <a:noFill/>
+        </p:spPr>
+        <p:txBody>
+          <a:bodyPr wrap="square" rtlCol="0">
+            <a:spAutoFit/>
+          </a:bodyPr>
+          <a:lstStyle/>
+          <a:p>
+            <a:r>
+              <a:rPr lang="en-US" altLang="zh-CN" sz="2400" b="1" dirty="0" smtClean="0">
+                <a:solidFill>
+                  <a:srgbClr val="C00000"/>
+                </a:solidFill>
+                <a:effectLst>
+                  <a:outerShdw blurRad="38100" dist="38100" dir="2700000" algn="tl">
+                    <a:srgbClr val="000000">
+                      <a:alpha val="43137"/>
+                    </a:srgbClr>
+                  </a:outerShdw>
+                </a:effectLst>
+              </a:rPr>
+              <a:t>//</a:t>
+            </a:r>
+            <a:endParaRPr lang="zh-CN" altLang="en-US" sz="2400" b="1" dirty="0">
+              <a:solidFill>
+                <a:srgbClr val="C00000"/>
+              </a:solidFill>
+              <a:effectLst>
+                <a:outerShdw blurRad="38100" dist="38100" dir="2700000" algn="tl">
+                  <a:srgbClr val="000000">
+                    <a:alpha val="43137"/>
+                  </a:srgbClr>
+                </a:outerShdw>
+              </a:effectLst>
+            </a:endParaRPr>
+          </a:p>
+        </p:txBody>
+      </p:sp>
+      <p:sp>
+        <p:nvSpPr>
+          <p:cNvPr id="57" name="TextBox 56"/>
+          <p:cNvSpPr txBox="1"/>
+          <p:nvPr/>
+        </p:nvSpPr>
+        <p:spPr>
+          <a:xfrm>
+            <a:off x="7596336" y="2555089"/>
+            <a:ext cx="864096" cy="461665"/>
+          </a:xfrm>
+          <a:prstGeom prst="rect">
+            <a:avLst/>
+          </a:prstGeom>
+          <a:noFill/>
+        </p:spPr>
+        <p:txBody>
+          <a:bodyPr wrap="square" rtlCol="0">
+            <a:spAutoFit/>
+          </a:bodyPr>
+          <a:lstStyle/>
+          <a:p>
+            <a:r>
+              <a:rPr lang="en-US" altLang="zh-CN" sz="2400" b="1" dirty="0" smtClean="0">
+                <a:solidFill>
+                  <a:srgbClr val="C00000"/>
+                </a:solidFill>
+                <a:effectLst>
+                  <a:outerShdw blurRad="38100" dist="38100" dir="2700000" algn="tl">
+                    <a:srgbClr val="000000">
+                      <a:alpha val="43137"/>
+                    </a:srgbClr>
+                  </a:outerShdw>
+                </a:effectLst>
+              </a:rPr>
+              <a:t>//</a:t>
+            </a:r>
+            <a:endParaRPr lang="zh-CN" altLang="en-US" sz="2400" b="1" dirty="0">
+              <a:solidFill>
+                <a:srgbClr val="C00000"/>
+              </a:solidFill>
+              <a:effectLst>
+                <a:outerShdw blurRad="38100" dist="38100" dir="2700000" algn="tl">
+                  <a:srgbClr val="000000">
+                    <a:alpha val="43137"/>
+                  </a:srgbClr>
+                </a:outerShdw>
+              </a:effectLst>
+            </a:endParaRPr>
+          </a:p>
+        </p:txBody>
+      </p:sp>
+      <p:sp>
+        <p:nvSpPr>
+          <p:cNvPr id="58" name="TextBox 57"/>
+          <p:cNvSpPr txBox="1"/>
+          <p:nvPr/>
+        </p:nvSpPr>
+        <p:spPr>
+          <a:xfrm>
+            <a:off x="7989565" y="3138291"/>
+            <a:ext cx="864096" cy="461665"/>
+          </a:xfrm>
+          <a:prstGeom prst="rect">
+            <a:avLst/>
+          </a:prstGeom>
+          <a:noFill/>
+        </p:spPr>
+        <p:txBody>
+          <a:bodyPr wrap="square" rtlCol="0">
+            <a:spAutoFit/>
+          </a:bodyPr>
+          <a:lstStyle/>
+          <a:p>
+            <a:r>
+              <a:rPr lang="en-US" altLang="zh-CN" sz="2400" b="1" dirty="0" smtClean="0">
+                <a:solidFill>
+                  <a:srgbClr val="C00000"/>
+                </a:solidFill>
+                <a:effectLst>
+                  <a:outerShdw blurRad="38100" dist="38100" dir="2700000" algn="tl">
+                    <a:srgbClr val="000000">
+                      <a:alpha val="43137"/>
+                    </a:srgbClr>
+                  </a:outerShdw>
+                </a:effectLst>
+              </a:rPr>
+              <a:t>//</a:t>
+            </a:r>
+            <a:endParaRPr lang="zh-CN" altLang="en-US" sz="2400" b="1" dirty="0">
+              <a:solidFill>
+                <a:srgbClr val="C00000"/>
+              </a:solidFill>
+              <a:effectLst>
+                <a:outerShdw blurRad="38100" dist="38100" dir="2700000" algn="tl">
+                  <a:srgbClr val="000000">
+                    <a:alpha val="43137"/>
+                  </a:srgbClr>
+                </a:outerShdw>
+              </a:effectLst>
+            </a:endParaRPr>
+          </a:p>
+        </p:txBody>
+      </p:sp>
+      <p:sp>
+        <p:nvSpPr>
+          <p:cNvPr id="59" name="TextBox 58"/>
+          <p:cNvSpPr txBox="1"/>
+          <p:nvPr/>
+        </p:nvSpPr>
+        <p:spPr>
+          <a:xfrm>
+            <a:off x="8349605" y="3714355"/>
+            <a:ext cx="864096" cy="461665"/>
+          </a:xfrm>
+          <a:prstGeom prst="rect">
+            <a:avLst/>
+          </a:prstGeom>
+          <a:noFill/>
+        </p:spPr>
+        <p:txBody>
+          <a:bodyPr wrap="square" rtlCol="0">
+            <a:spAutoFit/>
+          </a:bodyPr>
+          <a:lstStyle/>
+          <a:p>
+            <a:r>
+              <a:rPr lang="en-US" altLang="zh-CN" sz="2400" b="1" dirty="0" smtClean="0">
+                <a:solidFill>
+                  <a:srgbClr val="C00000"/>
+                </a:solidFill>
+                <a:effectLst>
+                  <a:outerShdw blurRad="38100" dist="38100" dir="2700000" algn="tl">
+                    <a:srgbClr val="000000">
+                      <a:alpha val="43137"/>
+                    </a:srgbClr>
+                  </a:outerShdw>
+                </a:effectLst>
+              </a:rPr>
+              <a:t>//</a:t>
+            </a:r>
+            <a:endParaRPr lang="zh-CN" altLang="en-US" sz="2400" b="1" dirty="0">
+              <a:solidFill>
+                <a:srgbClr val="C00000"/>
+              </a:solidFill>
+              <a:effectLst>
+                <a:outerShdw blurRad="38100" dist="38100" dir="2700000" algn="tl">
+                  <a:srgbClr val="000000">
+                    <a:alpha val="43137"/>
+                  </a:srgbClr>
+                </a:outerShdw>
+              </a:effectLst>
+            </a:endParaRPr>
+          </a:p>
+        </p:txBody>
+      </p:sp>
+      <p:sp>
+        <p:nvSpPr>
+          <p:cNvPr id="60" name="TextBox 59"/>
+          <p:cNvSpPr txBox="1"/>
+          <p:nvPr/>
+        </p:nvSpPr>
+        <p:spPr>
+          <a:xfrm>
+            <a:off x="8174878" y="581779"/>
+            <a:ext cx="1266906" cy="584775"/>
+          </a:xfrm>
+          <a:prstGeom prst="rect">
+            <a:avLst/>
+          </a:prstGeom>
+          <a:noFill/>
+        </p:spPr>
+        <p:txBody>
+          <a:bodyPr wrap="square" rtlCol="0">
+            <a:spAutoFit/>
+          </a:bodyPr>
+          <a:lstStyle/>
+          <a:p>
+            <a:r>
+              <a:rPr lang="zh-CN" altLang="en-US" sz="1600" dirty="0"/>
+              <a:t>定时器</a:t>
+            </a:r>
+            <a:endParaRPr lang="en-US" altLang="zh-CN" sz="1600" dirty="0" smtClean="0"/>
+          </a:p>
+          <a:p>
+            <a:r>
+              <a:rPr lang="zh-CN" altLang="en-US" sz="1600" dirty="0"/>
+              <a:t>过期</a:t>
+            </a:r>
+          </a:p>
+        </p:txBody>
+      </p:sp>
+      <p:cxnSp>
+        <p:nvCxnSpPr>
+          <p:cNvPr id="62" name="直接箭头连接符 61"/>
+          <p:cNvCxnSpPr/>
+          <p:nvPr/>
+        </p:nvCxnSpPr>
+        <p:spPr>
+          <a:xfrm flipV="1">
+            <a:off x="6441730" y="1166554"/>
+            <a:ext cx="1811922" cy="0"/>
+          </a:xfrm>
+          <a:prstGeom prst="straightConnector1">
+            <a:avLst/>
+          </a:prstGeom>
+          <a:ln>
+            <a:solidFill>
+              <a:srgbClr val="00B050"/>
+            </a:solidFill>
+            <a:headEnd type="arrow"/>
+            <a:tailEnd type="arrow"/>
+          </a:ln>
+        </p:spPr>
+        <p:style>
+          <a:lnRef idx="3">
+            <a:schemeClr val="accent3"/>
+          </a:lnRef>
+          <a:fillRef idx="0">
+            <a:schemeClr val="accent3"/>
+          </a:fillRef>
+          <a:effectRef idx="2">
+            <a:schemeClr val="accent3"/>
+          </a:effectRef>
+          <a:fontRef idx="minor">
+            <a:schemeClr val="tx1"/>
+          </a:fontRef>
+        </p:style>
+      </p:cxnSp>
+      <p:sp>
+        <p:nvSpPr>
+          <p:cNvPr id="65" name="TextBox 64"/>
+          <p:cNvSpPr txBox="1"/>
+          <p:nvPr/>
+        </p:nvSpPr>
+        <p:spPr>
+          <a:xfrm>
+            <a:off x="6555035" y="815334"/>
+            <a:ext cx="1761381" cy="338554"/>
+          </a:xfrm>
+          <a:prstGeom prst="rect">
+            <a:avLst/>
+          </a:prstGeom>
+          <a:noFill/>
+        </p:spPr>
+        <p:txBody>
+          <a:bodyPr wrap="square" rtlCol="0">
+            <a:spAutoFit/>
+          </a:bodyPr>
+          <a:lstStyle/>
+          <a:p>
+            <a:r>
+              <a:rPr lang="zh-CN" altLang="en-US" sz="1600" dirty="0" smtClean="0">
+                <a:solidFill>
+                  <a:srgbClr val="00B050"/>
+                </a:solidFill>
+              </a:rPr>
+              <a:t>请求者持有租约</a:t>
+            </a:r>
+            <a:endParaRPr lang="zh-CN" altLang="en-US" sz="1600" dirty="0">
+              <a:solidFill>
+                <a:srgbClr val="00B050"/>
+              </a:solidFill>
+            </a:endParaRPr>
+          </a:p>
+        </p:txBody>
+      </p:sp>
+      <p:sp>
+        <p:nvSpPr>
+          <p:cNvPr id="66" name="TextBox 65"/>
+          <p:cNvSpPr txBox="1"/>
+          <p:nvPr/>
+        </p:nvSpPr>
+        <p:spPr>
+          <a:xfrm>
+            <a:off x="6518276" y="1582261"/>
+            <a:ext cx="1754187" cy="584775"/>
+          </a:xfrm>
+          <a:prstGeom prst="rect">
+            <a:avLst/>
+          </a:prstGeom>
+          <a:noFill/>
+        </p:spPr>
+        <p:txBody>
+          <a:bodyPr wrap="square" rtlCol="0">
+            <a:spAutoFit/>
+          </a:bodyPr>
+          <a:lstStyle/>
+          <a:p>
+            <a:r>
+              <a:rPr lang="zh-CN" altLang="en-US" sz="1600" dirty="0" smtClean="0"/>
+              <a:t>已获得租约：</a:t>
+            </a:r>
+            <a:endParaRPr lang="en-US" altLang="zh-CN" sz="1600" dirty="0" smtClean="0"/>
+          </a:p>
+          <a:p>
+            <a:r>
+              <a:rPr lang="zh-CN" altLang="en-US" sz="1600" dirty="0" smtClean="0"/>
+              <a:t>“我持有租约”</a:t>
+            </a:r>
+            <a:endParaRPr lang="zh-CN" altLang="en-US" sz="1600" dirty="0"/>
+          </a:p>
+        </p:txBody>
+      </p:sp>
+      <p:sp>
+        <p:nvSpPr>
+          <p:cNvPr id="67" name="TextBox 66"/>
+          <p:cNvSpPr txBox="1"/>
+          <p:nvPr/>
+        </p:nvSpPr>
+        <p:spPr>
+          <a:xfrm>
+            <a:off x="8398433" y="1597442"/>
+            <a:ext cx="2222239" cy="584775"/>
+          </a:xfrm>
+          <a:prstGeom prst="rect">
+            <a:avLst/>
+          </a:prstGeom>
+          <a:noFill/>
+        </p:spPr>
+        <p:txBody>
+          <a:bodyPr wrap="square" rtlCol="0">
+            <a:spAutoFit/>
+          </a:bodyPr>
+          <a:lstStyle/>
+          <a:p>
+            <a:r>
+              <a:rPr lang="zh-CN" altLang="en-US" sz="1600" dirty="0" smtClean="0"/>
+              <a:t>租约过期：</a:t>
+            </a:r>
+            <a:endParaRPr lang="en-US" altLang="zh-CN" sz="1600" dirty="0" smtClean="0"/>
+          </a:p>
+          <a:p>
+            <a:r>
+              <a:rPr lang="zh-CN" altLang="en-US" sz="1600" dirty="0" smtClean="0"/>
+              <a:t>“我没有持有租约”</a:t>
+            </a:r>
+            <a:endParaRPr lang="zh-CN" altLang="en-US" sz="1600" dirty="0"/>
+          </a:p>
+        </p:txBody>
+      </p:sp>
+      <p:sp>
+        <p:nvSpPr>
+          <p:cNvPr id="68" name="TextBox 67"/>
+          <p:cNvSpPr txBox="1"/>
+          <p:nvPr/>
+        </p:nvSpPr>
+        <p:spPr>
+          <a:xfrm>
+            <a:off x="5230004" y="4117722"/>
+            <a:ext cx="1492304" cy="584775"/>
+          </a:xfrm>
+          <a:prstGeom prst="rect">
+            <a:avLst/>
+          </a:prstGeom>
+          <a:noFill/>
+        </p:spPr>
+        <p:txBody>
+          <a:bodyPr wrap="square" rtlCol="0">
+            <a:spAutoFit/>
+          </a:bodyPr>
+          <a:lstStyle/>
+          <a:p>
+            <a:r>
+              <a:rPr lang="zh-CN" altLang="en-US" sz="1600" dirty="0" smtClean="0"/>
+              <a:t>启动定时器</a:t>
+            </a:r>
+            <a:endParaRPr lang="en-US" altLang="zh-CN" sz="1600" dirty="0" smtClean="0"/>
+          </a:p>
+          <a:p>
+            <a:r>
+              <a:rPr lang="en-US" altLang="zh-CN" sz="1600" dirty="0" smtClean="0"/>
+              <a:t>T</a:t>
+            </a:r>
+            <a:r>
+              <a:rPr lang="zh-CN" altLang="en-US" sz="1600" dirty="0" smtClean="0"/>
+              <a:t>秒超时</a:t>
+            </a:r>
+            <a:endParaRPr lang="zh-CN" altLang="en-US" sz="1600" dirty="0"/>
+          </a:p>
+        </p:txBody>
+      </p:sp>
+      <p:sp>
+        <p:nvSpPr>
+          <p:cNvPr id="69" name="TextBox 68"/>
+          <p:cNvSpPr txBox="1"/>
+          <p:nvPr/>
+        </p:nvSpPr>
+        <p:spPr>
+          <a:xfrm>
+            <a:off x="9255968" y="4176020"/>
+            <a:ext cx="1492304" cy="584775"/>
+          </a:xfrm>
+          <a:prstGeom prst="rect">
+            <a:avLst/>
+          </a:prstGeom>
+          <a:noFill/>
+        </p:spPr>
+        <p:txBody>
+          <a:bodyPr wrap="square" rtlCol="0">
+            <a:spAutoFit/>
+          </a:bodyPr>
+          <a:lstStyle/>
+          <a:p>
+            <a:r>
+              <a:rPr lang="zh-CN" altLang="en-US" sz="1600" dirty="0" smtClean="0"/>
+              <a:t>定时器过期</a:t>
+            </a:r>
+            <a:endParaRPr lang="en-US" altLang="zh-CN" sz="1600" dirty="0" smtClean="0"/>
+          </a:p>
+          <a:p>
+            <a:r>
+              <a:rPr lang="zh-CN" altLang="en-US" sz="1600" dirty="0" smtClean="0"/>
+              <a:t>状态清空</a:t>
+            </a:r>
+            <a:endParaRPr lang="zh-CN" altLang="en-US" sz="1600" dirty="0"/>
           </a:p>
         </p:txBody>
       </p:sp>

</xml_diff>